<commit_message>
Finalisation de ma partie de l'oral
</commit_message>
<xml_diff>
--- a/reports/presentation/kinocto_DT.pptx
+++ b/reports/presentation/kinocto_DT.pptx
@@ -145,9 +145,9 @@
           <c:layoutTarget val="inner"/>
           <c:xMode val="edge"/>
           <c:yMode val="edge"/>
-          <c:x val="0.20467012539403434"/>
-          <c:y val="0.1980738120166636"/>
-          <c:w val="0.74870541879618724"/>
+          <c:x val="0.11486647012342373"/>
+          <c:y val="0.1582697033616636"/>
+          <c:w val="0.73179207327873419"/>
           <c:h val="0.63123104879415048"/>
         </c:manualLayout>
       </c:layout>
@@ -592,13 +592,14 @@
           <c:showPercent val="0"/>
           <c:showBubbleSize val="0"/>
         </c:dLbls>
-        <c:axId val="594988992"/>
-        <c:axId val="594990144"/>
+        <c:axId val="557470784"/>
+        <c:axId val="557471360"/>
       </c:scatterChart>
       <c:valAx>
-        <c:axId val="594988992"/>
+        <c:axId val="557470784"/>
         <c:scaling>
           <c:orientation val="minMax"/>
+          <c:max val="20"/>
         </c:scaling>
         <c:delete val="0"/>
         <c:axPos val="b"/>
@@ -612,14 +613,14 @@
                   <a:defRPr sz="1200"/>
                 </a:pPr>
                 <a:r>
-                  <a:rPr lang="en-US" sz="1200"/>
+                  <a:rPr lang="en-US" sz="1200" dirty="0"/>
                   <a:t>Temps</a:t>
                 </a:r>
                 <a:r>
-                  <a:rPr lang="en-US" sz="1200" baseline="0"/>
+                  <a:rPr lang="en-US" sz="1200" baseline="0" dirty="0"/>
                   <a:t> (s)</a:t>
                 </a:r>
-                <a:endParaRPr lang="en-US" sz="1200"/>
+                <a:endParaRPr lang="en-US" sz="1200" dirty="0"/>
               </a:p>
             </c:rich>
           </c:tx>
@@ -627,8 +628,8 @@
             <c:manualLayout>
               <c:xMode val="edge"/>
               <c:yMode val="edge"/>
-              <c:x val="0.82817461497723366"/>
-              <c:y val="0.87084336034041665"/>
+              <c:x val="0.70779224446117928"/>
+              <c:y val="0.87084349288454499"/>
             </c:manualLayout>
           </c:layout>
           <c:overlay val="0"/>
@@ -637,7 +638,7 @@
         <c:majorTickMark val="out"/>
         <c:minorTickMark val="none"/>
         <c:tickLblPos val="nextTo"/>
-        <c:crossAx val="594990144"/>
+        <c:crossAx val="557471360"/>
         <c:crosses val="autoZero"/>
         <c:crossBetween val="midCat"/>
         <c:dispUnits>
@@ -645,7 +646,7 @@
         </c:dispUnits>
       </c:valAx>
       <c:valAx>
-        <c:axId val="594990144"/>
+        <c:axId val="557471360"/>
         <c:scaling>
           <c:orientation val="minMax"/>
           <c:max val="7000"/>
@@ -703,8 +704,8 @@
             <c:manualLayout>
               <c:xMode val="edge"/>
               <c:yMode val="edge"/>
-              <c:x val="0.13303189697153453"/>
-              <c:y val="8.2325031550142952E-2"/>
+              <c:x val="0.12674738728503043"/>
+              <c:y val="2.6340831535445405E-3"/>
             </c:manualLayout>
           </c:layout>
           <c:overlay val="0"/>
@@ -713,7 +714,7 @@
         <c:majorTickMark val="out"/>
         <c:minorTickMark val="none"/>
         <c:tickLblPos val="nextTo"/>
-        <c:crossAx val="594988992"/>
+        <c:crossAx val="557470784"/>
         <c:crosses val="autoZero"/>
         <c:crossBetween val="midCat"/>
       </c:valAx>
@@ -724,8 +725,8 @@
         <c:manualLayout>
           <c:xMode val="edge"/>
           <c:yMode val="edge"/>
-          <c:x val="0.35103293485609671"/>
-          <c:y val="0.88259206356780551"/>
+          <c:x val="0.27163182387100909"/>
+          <c:y val="0.88259190881691429"/>
           <c:w val="0.46142980362318486"/>
           <c:h val="4.1951246140132209E-2"/>
         </c:manualLayout>
@@ -825,7 +826,7 @@
             <a:fld id="{381DA2EF-BD8E-7540-8292-FDE805AE340C}" type="datetimeFigureOut">
               <a:rPr lang="en-US" smtClean="0"/>
               <a:pPr/>
-              <a:t>2/23/2013</a:t>
+              <a:t>2/24/2013</a:t>
             </a:fld>
             <a:endParaRPr lang="en-US"/>
           </a:p>
@@ -992,7 +993,7 @@
             <a:fld id="{2D05A41B-3834-2942-A655-D365844A6823}" type="datetimeFigureOut">
               <a:rPr lang="en-US" smtClean="0"/>
               <a:pPr/>
-              <a:t>2/23/2013</a:t>
+              <a:t>2/24/2013</a:t>
             </a:fld>
             <a:endParaRPr lang="en-US"/>
           </a:p>
@@ -1481,7 +1482,7 @@
             <a:fld id="{1B7D6F30-1720-D44A-AAAC-31BBD1F6EF97}" type="datetimeFigureOut">
               <a:rPr lang="en-US" smtClean="0"/>
               <a:pPr/>
-              <a:t>2/23/2013</a:t>
+              <a:t>2/24/2013</a:t>
             </a:fld>
             <a:endParaRPr lang="en-US"/>
           </a:p>
@@ -1812,7 +1813,7 @@
             <a:fld id="{1B7D6F30-1720-D44A-AAAC-31BBD1F6EF97}" type="datetimeFigureOut">
               <a:rPr lang="en-US" smtClean="0"/>
               <a:pPr/>
-              <a:t>2/23/2013</a:t>
+              <a:t>2/24/2013</a:t>
             </a:fld>
             <a:endParaRPr lang="en-US"/>
           </a:p>
@@ -2099,7 +2100,7 @@
             <a:fld id="{1B7D6F30-1720-D44A-AAAC-31BBD1F6EF97}" type="datetimeFigureOut">
               <a:rPr lang="en-US" smtClean="0"/>
               <a:pPr/>
-              <a:t>2/23/2013</a:t>
+              <a:t>2/24/2013</a:t>
             </a:fld>
             <a:endParaRPr lang="en-US"/>
           </a:p>
@@ -2402,7 +2403,7 @@
             <a:fld id="{1B7D6F30-1720-D44A-AAAC-31BBD1F6EF97}" type="datetimeFigureOut">
               <a:rPr lang="en-US" smtClean="0"/>
               <a:pPr/>
-              <a:t>2/23/2013</a:t>
+              <a:t>2/24/2013</a:t>
             </a:fld>
             <a:endParaRPr lang="en-US"/>
           </a:p>
@@ -2740,7 +2741,7 @@
             <a:fld id="{1B7D6F30-1720-D44A-AAAC-31BBD1F6EF97}" type="datetimeFigureOut">
               <a:rPr lang="en-US" smtClean="0"/>
               <a:pPr/>
-              <a:t>2/23/2013</a:t>
+              <a:t>2/24/2013</a:t>
             </a:fld>
             <a:endParaRPr lang="en-US"/>
           </a:p>
@@ -3000,7 +3001,7 @@
             <a:fld id="{1B7D6F30-1720-D44A-AAAC-31BBD1F6EF97}" type="datetimeFigureOut">
               <a:rPr lang="en-US" smtClean="0"/>
               <a:pPr/>
-              <a:t>2/23/2013</a:t>
+              <a:t>2/24/2013</a:t>
             </a:fld>
             <a:endParaRPr lang="en-US"/>
           </a:p>
@@ -3189,7 +3190,7 @@
             <a:fld id="{1B7D6F30-1720-D44A-AAAC-31BBD1F6EF97}" type="datetimeFigureOut">
               <a:rPr lang="en-US" smtClean="0"/>
               <a:pPr/>
-              <a:t>2/23/2013</a:t>
+              <a:t>2/24/2013</a:t>
             </a:fld>
             <a:endParaRPr lang="en-US"/>
           </a:p>
@@ -3373,7 +3374,7 @@
             <a:fld id="{1B7D6F30-1720-D44A-AAAC-31BBD1F6EF97}" type="datetimeFigureOut">
               <a:rPr lang="en-US" smtClean="0"/>
               <a:pPr/>
-              <a:t>2/23/2013</a:t>
+              <a:t>2/24/2013</a:t>
             </a:fld>
             <a:endParaRPr lang="en-US"/>
           </a:p>
@@ -3652,7 +3653,7 @@
             <a:fld id="{1B7D6F30-1720-D44A-AAAC-31BBD1F6EF97}" type="datetimeFigureOut">
               <a:rPr lang="en-US" smtClean="0"/>
               <a:pPr/>
-              <a:t>2/23/2013</a:t>
+              <a:t>2/24/2013</a:t>
             </a:fld>
             <a:endParaRPr lang="en-US"/>
           </a:p>
@@ -3968,7 +3969,7 @@
             <a:fld id="{1B7D6F30-1720-D44A-AAAC-31BBD1F6EF97}" type="datetimeFigureOut">
               <a:rPr lang="en-US" smtClean="0"/>
               <a:pPr/>
-              <a:t>2/23/2013</a:t>
+              <a:t>2/24/2013</a:t>
             </a:fld>
             <a:endParaRPr lang="en-US"/>
           </a:p>
@@ -4270,7 +4271,7 @@
             <a:fld id="{1B7D6F30-1720-D44A-AAAC-31BBD1F6EF97}" type="datetimeFigureOut">
               <a:rPr lang="en-US" smtClean="0"/>
               <a:pPr/>
-              <a:t>2/23/2013</a:t>
+              <a:t>2/24/2013</a:t>
             </a:fld>
             <a:endParaRPr lang="en-US"/>
           </a:p>
@@ -4710,7 +4711,7 @@
             <a:fld id="{1B7D6F30-1720-D44A-AAAC-31BBD1F6EF97}" type="datetimeFigureOut">
               <a:rPr lang="en-US" smtClean="0"/>
               <a:pPr/>
-              <a:t>2/23/2013</a:t>
+              <a:t>2/24/2013</a:t>
             </a:fld>
             <a:endParaRPr lang="en-US"/>
           </a:p>
@@ -5066,7 +5067,7 @@
             <a:fld id="{1B7D6F30-1720-D44A-AAAC-31BBD1F6EF97}" type="datetimeFigureOut">
               <a:rPr lang="en-US" smtClean="0"/>
               <a:pPr/>
-              <a:t>2/23/2013</a:t>
+              <a:t>2/24/2013</a:t>
             </a:fld>
             <a:endParaRPr lang="en-US"/>
           </a:p>
@@ -5166,7 +5167,7 @@
             <a:fld id="{1B7D6F30-1720-D44A-AAAC-31BBD1F6EF97}" type="datetimeFigureOut">
               <a:rPr lang="en-US" smtClean="0"/>
               <a:pPr/>
-              <a:t>2/23/2013</a:t>
+              <a:t>2/24/2013</a:t>
             </a:fld>
             <a:endParaRPr lang="en-US"/>
           </a:p>
@@ -5513,7 +5514,7 @@
             <a:fld id="{1B7D6F30-1720-D44A-AAAC-31BBD1F6EF97}" type="datetimeFigureOut">
               <a:rPr lang="en-US" smtClean="0"/>
               <a:pPr/>
-              <a:t>2/23/2013</a:t>
+              <a:t>2/24/2013</a:t>
             </a:fld>
             <a:endParaRPr lang="en-US"/>
           </a:p>
@@ -5735,7 +5736,7 @@
             <a:fld id="{1B7D6F30-1720-D44A-AAAC-31BBD1F6EF97}" type="datetimeFigureOut">
               <a:rPr lang="en-US" smtClean="0"/>
               <a:pPr/>
-              <a:t>2/23/2013</a:t>
+              <a:t>2/24/2013</a:t>
             </a:fld>
             <a:endParaRPr lang="en-US"/>
           </a:p>
@@ -6378,7 +6379,6 @@
               <a:rPr lang="fr-FR" b="1" dirty="0" smtClean="0"/>
               <a:t>Réalisation d’une alimentation 5V</a:t>
             </a:r>
-            <a:endParaRPr lang="fr-FR" b="1" dirty="0" smtClean="0"/>
           </a:p>
           <a:p>
             <a:endParaRPr lang="fr-FR" dirty="0"/>
@@ -6388,7 +6388,6 @@
               <a:rPr lang="fr-FR" dirty="0" smtClean="0"/>
               <a:t>Rendement supérieur à 85%</a:t>
             </a:r>
-            <a:endParaRPr lang="fr-FR" dirty="0" smtClean="0"/>
           </a:p>
           <a:p>
             <a:r>
@@ -6491,11 +6490,11 @@
   <p:clrMapOvr>
     <a:masterClrMapping/>
   </p:clrMapOvr>
-  <mc:AlternateContent xmlns:mc="http://schemas.openxmlformats.org/markup-compatibility/2006">
-    <mc:Choice xmlns:p14="http://schemas.microsoft.com/office/powerpoint/2010/main" Requires="p14">
+  <mc:AlternateContent xmlns:mc="http://schemas.openxmlformats.org/markup-compatibility/2006" xmlns:p14="http://schemas.microsoft.com/office/powerpoint/2010/main">
+    <mc:Choice Requires="p14">
       <p:transition p14:dur="10"/>
     </mc:Choice>
-    <mc:Fallback>
+    <mc:Fallback xmlns="">
       <p:transition/>
     </mc:Fallback>
   </mc:AlternateContent>
@@ -6722,7 +6721,7 @@
       </p:grpSpPr>
       <p:sp>
         <p:nvSpPr>
-          <p:cNvPr id="2" name="Title 1"/>
+          <p:cNvPr id="3" name="Title 2"/>
           <p:cNvSpPr>
             <a:spLocks noGrp="1"/>
           </p:cNvSpPr>
@@ -6735,17 +6734,54 @@
           <a:bodyPr/>
           <a:lstStyle/>
           <a:p>
-            <a:r>
-              <a:rPr lang="en-CA" dirty="0" err="1" smtClean="0"/>
-              <a:t>Asservissement</a:t>
-            </a:r>
-            <a:r>
-              <a:rPr lang="en-CA" dirty="0" smtClean="0"/>
-              <a:t> des </a:t>
-            </a:r>
-            <a:r>
-              <a:rPr lang="en-CA" dirty="0" err="1" smtClean="0"/>
-              <a:t>roues</a:t>
+            <a:endParaRPr lang="en-US"/>
+          </a:p>
+        </p:txBody>
+      </p:sp>
+      <p:sp>
+        <p:nvSpPr>
+          <p:cNvPr id="9" name="Title 1"/>
+          <p:cNvSpPr txBox="1">
+            <a:spLocks/>
+          </p:cNvSpPr>
+          <p:nvPr/>
+        </p:nvSpPr>
+        <p:spPr>
+          <a:xfrm>
+            <a:off x="0" y="700526"/>
+            <a:ext cx="8913813" cy="914400"/>
+          </a:xfrm>
+          <a:prstGeom prst="rect">
+            <a:avLst/>
+          </a:prstGeom>
+          <a:solidFill>
+            <a:schemeClr val="tx2"/>
+          </a:solidFill>
+        </p:spPr>
+        <p:txBody>
+          <a:bodyPr vert="horz" lIns="1188720" tIns="45720" rIns="274320" bIns="45720" rtlCol="0" anchor="ctr">
+            <a:normAutofit/>
+          </a:bodyPr>
+          <a:lstStyle>
+            <a:lvl1pPr marL="0" indent="0" algn="l" defTabSz="914400" rtl="0" eaLnBrk="1" latinLnBrk="0" hangingPunct="1">
+              <a:spcBef>
+                <a:spcPct val="0"/>
+              </a:spcBef>
+              <a:buNone/>
+              <a:defRPr sz="3600" kern="1200">
+                <a:solidFill>
+                  <a:schemeClr val="bg1"/>
+                </a:solidFill>
+                <a:latin typeface="+mj-lt"/>
+                <a:ea typeface="+mj-ea"/>
+                <a:cs typeface="+mj-cs"/>
+              </a:defRPr>
+            </a:lvl1pPr>
+          </a:lstStyle>
+          <a:p>
+            <a:r>
+              <a:rPr lang="en-CA" smtClean="0"/>
+              <a:t>Asservissement des roues</a:t>
             </a:r>
             <a:endParaRPr lang="en-US" dirty="0"/>
           </a:p>
@@ -6753,21 +6789,21 @@
       </p:sp>
       <p:graphicFrame>
         <p:nvGraphicFramePr>
-          <p:cNvPr id="6" name="Chart 5"/>
+          <p:cNvPr id="10" name="Chart 9"/>
           <p:cNvGraphicFramePr>
             <a:graphicFrameLocks noGrp="1"/>
           </p:cNvGraphicFramePr>
           <p:nvPr>
             <p:extLst>
               <p:ext uri="{D42A27DB-BD31-4B8C-83A1-F6EECF244321}">
-                <p14:modId xmlns:p14="http://schemas.microsoft.com/office/powerpoint/2010/main" val="2318544930"/>
+                <p14:modId xmlns:p14="http://schemas.microsoft.com/office/powerpoint/2010/main" val="2587878666"/>
               </p:ext>
             </p:extLst>
           </p:nvPr>
         </p:nvGraphicFramePr>
         <p:xfrm>
-          <a:off x="-499987" y="1614926"/>
-          <a:ext cx="4505318" cy="5385871"/>
+          <a:off x="0" y="1614928"/>
+          <a:ext cx="4958366" cy="2918436"/>
         </p:xfrm>
         <a:graphic>
           <a:graphicData uri="http://schemas.openxmlformats.org/drawingml/2006/chart">
@@ -6775,6 +6811,111 @@
           </a:graphicData>
         </a:graphic>
       </p:graphicFrame>
+      <p:sp>
+        <p:nvSpPr>
+          <p:cNvPr id="11" name="Espace réservé du contenu 2"/>
+          <p:cNvSpPr>
+            <a:spLocks noGrp="1"/>
+          </p:cNvSpPr>
+          <p:nvPr>
+            <p:ph idx="1"/>
+          </p:nvPr>
+        </p:nvSpPr>
+        <p:spPr>
+          <a:xfrm>
+            <a:off x="4185634" y="1614926"/>
+            <a:ext cx="4805453" cy="5030573"/>
+          </a:xfrm>
+        </p:spPr>
+        <p:txBody>
+          <a:bodyPr>
+            <a:normAutofit/>
+          </a:bodyPr>
+          <a:lstStyle/>
+          <a:p>
+            <a:pPr marL="0" indent="0">
+              <a:lnSpc>
+                <a:spcPct val="160000"/>
+              </a:lnSpc>
+              <a:buNone/>
+            </a:pPr>
+            <a:r>
+              <a:rPr lang="fr-FR" b="1" dirty="0" smtClean="0"/>
+              <a:t>Optimiser la réponse des roues</a:t>
+            </a:r>
+            <a:endParaRPr lang="fr-FR" b="1" dirty="0"/>
+          </a:p>
+          <a:p>
+            <a:r>
+              <a:rPr lang="fr-FR" dirty="0" smtClean="0"/>
+              <a:t>Obtenir la réponse la plus rapide possible</a:t>
+            </a:r>
+          </a:p>
+          <a:p>
+            <a:r>
+              <a:rPr lang="fr-FR" dirty="0" smtClean="0"/>
+              <a:t>Minimiser le dépassement</a:t>
+            </a:r>
+          </a:p>
+          <a:p>
+            <a:r>
+              <a:rPr lang="fr-FR" dirty="0" smtClean="0"/>
+              <a:t>Limiter les ondulations</a:t>
+            </a:r>
+          </a:p>
+          <a:p>
+            <a:r>
+              <a:rPr lang="fr-FR" dirty="0" smtClean="0"/>
+              <a:t>Maximiser la stabilité en charge</a:t>
+            </a:r>
+          </a:p>
+          <a:p>
+            <a:r>
+              <a:rPr lang="fr-FR" dirty="0" smtClean="0"/>
+              <a:t>Ajout de filtres de consigne</a:t>
+            </a:r>
+          </a:p>
+          <a:p>
+            <a:r>
+              <a:rPr lang="fr-FR" dirty="0" smtClean="0"/>
+              <a:t>Essais combinés avec CAO</a:t>
+            </a:r>
+          </a:p>
+          <a:p>
+            <a:endParaRPr lang="fr-FR" dirty="0" smtClean="0"/>
+          </a:p>
+        </p:txBody>
+      </p:sp>
+      <p:pic>
+        <p:nvPicPr>
+          <p:cNvPr id="12" name="Picture 11"/>
+          <p:cNvPicPr>
+            <a:picLocks noChangeAspect="1"/>
+          </p:cNvPicPr>
+          <p:nvPr/>
+        </p:nvPicPr>
+        <p:blipFill>
+          <a:blip r:embed="rId3">
+            <a:extLst>
+              <a:ext uri="{28A0092B-C50C-407E-A947-70E740481C1C}">
+                <a14:useLocalDpi xmlns:a14="http://schemas.microsoft.com/office/drawing/2010/main" val="0"/>
+              </a:ext>
+            </a:extLst>
+          </a:blip>
+          <a:stretch>
+            <a:fillRect/>
+          </a:stretch>
+        </p:blipFill>
+        <p:spPr>
+          <a:xfrm>
+            <a:off x="231822" y="4365033"/>
+            <a:ext cx="3857143" cy="2428572"/>
+          </a:xfrm>
+          <a:prstGeom prst="rect">
+            <a:avLst/>
+          </a:prstGeom>
+        </p:spPr>
+      </p:pic>
     </p:spTree>
     <p:extLst>
       <p:ext uri="{BB962C8B-B14F-4D97-AF65-F5344CB8AC3E}">

</xml_diff>